<commit_message>
adding linear business image
</commit_message>
<xml_diff>
--- a/api-days-australia-2020/img/platform-perspectives.pptx
+++ b/api-days-australia-2020/img/platform-perspectives.pptx
@@ -6,8 +6,9 @@
   </p:sldMasterIdLst>
   <p:sldIdLst>
     <p:sldId id="256" r:id="rId2"/>
-    <p:sldId id="257" r:id="rId3"/>
-    <p:sldId id="258" r:id="rId4"/>
+    <p:sldId id="259" r:id="rId3"/>
+    <p:sldId id="257" r:id="rId4"/>
+    <p:sldId id="258" r:id="rId5"/>
   </p:sldIdLst>
   <p:sldSz cx="12192000" cy="6858000"/>
   <p:notesSz cx="6858000" cy="9144000"/>
@@ -3342,6 +3343,265 @@
         </p:nvSpPr>
         <p:spPr>
           <a:xfrm>
+            <a:off x="3776665" y="4257675"/>
+            <a:ext cx="2757486" cy="671514"/>
+          </a:xfrm>
+          <a:prstGeom prst="rect">
+            <a:avLst/>
+          </a:prstGeom>
+          <a:solidFill>
+            <a:schemeClr val="accent1">
+              <a:lumMod val="40000"/>
+              <a:lumOff val="60000"/>
+            </a:schemeClr>
+          </a:solidFill>
+        </p:spPr>
+        <p:style>
+          <a:lnRef idx="2">
+            <a:schemeClr val="accent1">
+              <a:shade val="50000"/>
+            </a:schemeClr>
+          </a:lnRef>
+          <a:fillRef idx="1">
+            <a:schemeClr val="accent1"/>
+          </a:fillRef>
+          <a:effectRef idx="0">
+            <a:schemeClr val="accent1"/>
+          </a:effectRef>
+          <a:fontRef idx="minor">
+            <a:schemeClr val="lt1"/>
+          </a:fontRef>
+        </p:style>
+        <p:txBody>
+          <a:bodyPr rtlCol="0" anchor="ctr"/>
+          <a:lstStyle/>
+          <a:p>
+            <a:pPr algn="ctr"/>
+            <a:r>
+              <a:rPr lang="en-US" sz="2800" dirty="0"/>
+              <a:t>Production</a:t>
+            </a:r>
+          </a:p>
+        </p:txBody>
+      </p:sp>
+      <p:pic>
+        <p:nvPicPr>
+          <p:cNvPr id="8" name="Graphic 7" descr="Children">
+            <a:extLst>
+              <a:ext uri="{FF2B5EF4-FFF2-40B4-BE49-F238E27FC236}">
+                <a16:creationId xmlns:a16="http://schemas.microsoft.com/office/drawing/2014/main" id="{2667A9CE-B04D-CC4C-8313-29A1AB2D748D}"/>
+              </a:ext>
+            </a:extLst>
+          </p:cNvPr>
+          <p:cNvPicPr>
+            <a:picLocks noChangeAspect="1"/>
+          </p:cNvPicPr>
+          <p:nvPr/>
+        </p:nvPicPr>
+        <p:blipFill>
+          <a:blip r:embed="rId2">
+            <a:extLst>
+              <a:ext uri="{96DAC541-7B7A-43D3-8B79-37D633B846F1}">
+                <asvg:svgBlip xmlns:asvg="http://schemas.microsoft.com/office/drawing/2016/SVG/main" r:embed="rId3"/>
+              </a:ext>
+            </a:extLst>
+          </a:blip>
+          <a:stretch>
+            <a:fillRect/>
+          </a:stretch>
+        </p:blipFill>
+        <p:spPr>
+          <a:xfrm>
+            <a:off x="4214814" y="863255"/>
+            <a:ext cx="1881186" cy="1881186"/>
+          </a:xfrm>
+          <a:prstGeom prst="rect">
+            <a:avLst/>
+          </a:prstGeom>
+        </p:spPr>
+      </p:pic>
+      <p:sp>
+        <p:nvSpPr>
+          <p:cNvPr id="11" name="Up Arrow 10">
+            <a:extLst>
+              <a:ext uri="{FF2B5EF4-FFF2-40B4-BE49-F238E27FC236}">
+                <a16:creationId xmlns:a16="http://schemas.microsoft.com/office/drawing/2014/main" id="{D2F85A35-0616-BB4A-8685-62B94DFAE314}"/>
+              </a:ext>
+            </a:extLst>
+          </p:cNvPr>
+          <p:cNvSpPr/>
+          <p:nvPr/>
+        </p:nvSpPr>
+        <p:spPr>
+          <a:xfrm>
+            <a:off x="3776664" y="2568492"/>
+            <a:ext cx="2757487" cy="1443296"/>
+          </a:xfrm>
+          <a:prstGeom prst="upArrow">
+            <a:avLst>
+              <a:gd name="adj1" fmla="val 81088"/>
+              <a:gd name="adj2" fmla="val 36286"/>
+            </a:avLst>
+          </a:prstGeom>
+          <a:solidFill>
+            <a:schemeClr val="accent1">
+              <a:alpha val="60000"/>
+            </a:schemeClr>
+          </a:solidFill>
+        </p:spPr>
+        <p:style>
+          <a:lnRef idx="2">
+            <a:schemeClr val="accent1">
+              <a:shade val="50000"/>
+            </a:schemeClr>
+          </a:lnRef>
+          <a:fillRef idx="1">
+            <a:schemeClr val="accent1"/>
+          </a:fillRef>
+          <a:effectRef idx="0">
+            <a:schemeClr val="accent1"/>
+          </a:effectRef>
+          <a:fontRef idx="minor">
+            <a:schemeClr val="lt1"/>
+          </a:fontRef>
+        </p:style>
+        <p:txBody>
+          <a:bodyPr rtlCol="0" anchor="ctr"/>
+          <a:lstStyle/>
+          <a:p>
+            <a:pPr algn="ctr"/>
+            <a:endParaRPr lang="en-US" sz="2800" dirty="0"/>
+          </a:p>
+          <a:p>
+            <a:pPr algn="ctr"/>
+            <a:r>
+              <a:rPr lang="en-US" sz="2800" dirty="0"/>
+              <a:t>Products</a:t>
+            </a:r>
+            <a:endParaRPr lang="en-US" sz="2000" dirty="0"/>
+          </a:p>
+          <a:p>
+            <a:pPr algn="ctr"/>
+            <a:endParaRPr lang="en-US" sz="2000" dirty="0"/>
+          </a:p>
+          <a:p>
+            <a:pPr algn="ctr"/>
+            <a:endParaRPr lang="en-US" sz="2800" dirty="0"/>
+          </a:p>
+        </p:txBody>
+      </p:sp>
+      <p:sp>
+        <p:nvSpPr>
+          <p:cNvPr id="16" name="Rectangle 15">
+            <a:extLst>
+              <a:ext uri="{FF2B5EF4-FFF2-40B4-BE49-F238E27FC236}">
+                <a16:creationId xmlns:a16="http://schemas.microsoft.com/office/drawing/2014/main" id="{91A6611A-22FD-C54D-B580-81ADE8F9ABDF}"/>
+              </a:ext>
+            </a:extLst>
+          </p:cNvPr>
+          <p:cNvSpPr/>
+          <p:nvPr/>
+        </p:nvSpPr>
+        <p:spPr>
+          <a:xfrm>
+            <a:off x="3776664" y="5175076"/>
+            <a:ext cx="2757487" cy="1284375"/>
+          </a:xfrm>
+          <a:prstGeom prst="rect">
+            <a:avLst/>
+          </a:prstGeom>
+          <a:solidFill>
+            <a:schemeClr val="accent1">
+              <a:alpha val="60000"/>
+            </a:schemeClr>
+          </a:solidFill>
+          <a:ln>
+            <a:solidFill>
+              <a:schemeClr val="accent1">
+                <a:shade val="50000"/>
+              </a:schemeClr>
+            </a:solidFill>
+          </a:ln>
+        </p:spPr>
+        <p:style>
+          <a:lnRef idx="2">
+            <a:schemeClr val="accent1">
+              <a:shade val="50000"/>
+            </a:schemeClr>
+          </a:lnRef>
+          <a:fillRef idx="1">
+            <a:schemeClr val="accent1"/>
+          </a:fillRef>
+          <a:effectRef idx="0">
+            <a:schemeClr val="accent1"/>
+          </a:effectRef>
+          <a:fontRef idx="minor">
+            <a:schemeClr val="lt1"/>
+          </a:fontRef>
+        </p:style>
+        <p:txBody>
+          <a:bodyPr rtlCol="0" anchor="ctr"/>
+          <a:lstStyle/>
+          <a:p>
+            <a:pPr algn="ctr"/>
+            <a:r>
+              <a:rPr lang="en-US" sz="2800" dirty="0"/>
+              <a:t>Assets/</a:t>
+            </a:r>
+          </a:p>
+          <a:p>
+            <a:pPr algn="ctr"/>
+            <a:r>
+              <a:rPr lang="en-US" sz="2800" dirty="0"/>
+              <a:t>Capabilities</a:t>
+            </a:r>
+          </a:p>
+        </p:txBody>
+      </p:sp>
+    </p:spTree>
+    <p:extLst>
+      <p:ext uri="{BB962C8B-B14F-4D97-AF65-F5344CB8AC3E}">
+        <p14:creationId xmlns:p14="http://schemas.microsoft.com/office/powerpoint/2010/main" val="1283988183"/>
+      </p:ext>
+    </p:extLst>
+  </p:cSld>
+  <p:clrMapOvr>
+    <a:masterClrMapping/>
+  </p:clrMapOvr>
+</p:sld>
+</file>
+
+<file path=ppt/slides/slide2.xml><?xml version="1.0" encoding="utf-8"?>
+<p:sld xmlns:a="http://schemas.openxmlformats.org/drawingml/2006/main" xmlns:r="http://schemas.openxmlformats.org/officeDocument/2006/relationships" xmlns:p="http://schemas.openxmlformats.org/presentationml/2006/main">
+  <p:cSld>
+    <p:spTree>
+      <p:nvGrpSpPr>
+        <p:cNvPr id="1" name=""/>
+        <p:cNvGrpSpPr/>
+        <p:nvPr/>
+      </p:nvGrpSpPr>
+      <p:grpSpPr>
+        <a:xfrm>
+          <a:off x="0" y="0"/>
+          <a:ext cx="0" cy="0"/>
+          <a:chOff x="0" y="0"/>
+          <a:chExt cx="0" cy="0"/>
+        </a:xfrm>
+      </p:grpSpPr>
+      <p:sp>
+        <p:nvSpPr>
+          <p:cNvPr id="6" name="Rectangle 5">
+            <a:extLst>
+              <a:ext uri="{FF2B5EF4-FFF2-40B4-BE49-F238E27FC236}">
+                <a16:creationId xmlns:a16="http://schemas.microsoft.com/office/drawing/2014/main" id="{5629FDD7-247E-9347-BB56-FC5B332A5706}"/>
+              </a:ext>
+            </a:extLst>
+          </p:cNvPr>
+          <p:cNvSpPr/>
+          <p:nvPr/>
+        </p:nvSpPr>
+        <p:spPr>
+          <a:xfrm>
             <a:off x="2200275" y="4257675"/>
             <a:ext cx="6013264" cy="671514"/>
           </a:xfrm>
@@ -3467,6 +3727,10 @@
         <p:txBody>
           <a:bodyPr rtlCol="0" anchor="ctr"/>
           <a:lstStyle/>
+          <a:p>
+            <a:pPr algn="ctr"/>
+            <a:endParaRPr lang="en-US" sz="2800" dirty="0"/>
+          </a:p>
           <a:p>
             <a:pPr algn="ctr"/>
             <a:r>
@@ -3642,7 +3906,7 @@
     </p:spTree>
     <p:extLst>
       <p:ext uri="{BB962C8B-B14F-4D97-AF65-F5344CB8AC3E}">
-        <p14:creationId xmlns:p14="http://schemas.microsoft.com/office/powerpoint/2010/main" val="1283988183"/>
+        <p14:creationId xmlns:p14="http://schemas.microsoft.com/office/powerpoint/2010/main" val="2426384793"/>
       </p:ext>
     </p:extLst>
   </p:cSld>
@@ -3652,7 +3916,7 @@
 </p:sld>
 </file>
 
-<file path=ppt/slides/slide2.xml><?xml version="1.0" encoding="utf-8"?>
+<file path=ppt/slides/slide3.xml><?xml version="1.0" encoding="utf-8"?>
 <p:sld xmlns:a="http://schemas.openxmlformats.org/drawingml/2006/main" xmlns:r="http://schemas.openxmlformats.org/officeDocument/2006/relationships" xmlns:p="http://schemas.openxmlformats.org/presentationml/2006/main">
   <p:cSld>
     <p:spTree>
@@ -3998,7 +4262,7 @@
         </p:nvSpPr>
         <p:spPr>
           <a:xfrm>
-            <a:off x="4863559" y="3658306"/>
+            <a:off x="3235672" y="3658482"/>
             <a:ext cx="686689" cy="484893"/>
           </a:xfrm>
           <a:prstGeom prst="upArrow">
@@ -4039,6 +4303,10 @@
               <a:rPr lang="en-US" dirty="0"/>
               <a:t>2</a:t>
             </a:r>
+          </a:p>
+          <a:p>
+            <a:pPr algn="ctr"/>
+            <a:endParaRPr lang="en-US" sz="1400" dirty="0"/>
           </a:p>
         </p:txBody>
       </p:sp>
@@ -4093,9 +4361,71 @@
           <a:lstStyle/>
           <a:p>
             <a:pPr algn="ctr"/>
+            <a:endParaRPr lang="en-US" sz="1600" dirty="0"/>
+          </a:p>
+          <a:p>
+            <a:pPr algn="ctr"/>
             <a:r>
               <a:rPr lang="en-US" dirty="0"/>
               <a:t>1</a:t>
+            </a:r>
+          </a:p>
+        </p:txBody>
+      </p:sp>
+      <p:sp>
+        <p:nvSpPr>
+          <p:cNvPr id="10" name="Down Arrow 9">
+            <a:extLst>
+              <a:ext uri="{FF2B5EF4-FFF2-40B4-BE49-F238E27FC236}">
+                <a16:creationId xmlns:a16="http://schemas.microsoft.com/office/drawing/2014/main" id="{7F40616D-C2A6-2F41-8103-D69A8AC02A02}"/>
+              </a:ext>
+            </a:extLst>
+          </p:cNvPr>
+          <p:cNvSpPr/>
+          <p:nvPr/>
+        </p:nvSpPr>
+        <p:spPr>
+          <a:xfrm>
+            <a:off x="6491449" y="3665282"/>
+            <a:ext cx="686689" cy="484893"/>
+          </a:xfrm>
+          <a:prstGeom prst="downArrow">
+            <a:avLst>
+              <a:gd name="adj1" fmla="val 70806"/>
+              <a:gd name="adj2" fmla="val 50000"/>
+            </a:avLst>
+          </a:prstGeom>
+          <a:solidFill>
+            <a:schemeClr val="accent6">
+              <a:lumMod val="75000"/>
+              <a:alpha val="60000"/>
+            </a:schemeClr>
+          </a:solidFill>
+        </p:spPr>
+        <p:style>
+          <a:lnRef idx="2">
+            <a:schemeClr val="accent1">
+              <a:shade val="50000"/>
+            </a:schemeClr>
+          </a:lnRef>
+          <a:fillRef idx="1">
+            <a:schemeClr val="accent1"/>
+          </a:fillRef>
+          <a:effectRef idx="0">
+            <a:schemeClr val="accent1"/>
+          </a:effectRef>
+          <a:fontRef idx="minor">
+            <a:schemeClr val="lt1"/>
+          </a:fontRef>
+        </p:style>
+        <p:txBody>
+          <a:bodyPr rtlCol="0" anchor="ctr"/>
+          <a:lstStyle/>
+          <a:p>
+            <a:pPr algn="ctr"/>
+            <a:r>
+              <a:rPr lang="en-US" dirty="0"/>
+              <a:t>3</a:t>
             </a:r>
           </a:p>
         </p:txBody>
@@ -4113,7 +4443,7 @@
 </p:sld>
 </file>
 
-<file path=ppt/slides/slide3.xml><?xml version="1.0" encoding="utf-8"?>
+<file path=ppt/slides/slide4.xml><?xml version="1.0" encoding="utf-8"?>
 <p:sld xmlns:a="http://schemas.openxmlformats.org/drawingml/2006/main" xmlns:r="http://schemas.openxmlformats.org/officeDocument/2006/relationships" xmlns:p="http://schemas.openxmlformats.org/presentationml/2006/main">
   <p:cSld>
     <p:spTree>
@@ -4213,7 +4543,7 @@
         </p:blipFill>
         <p:spPr>
           <a:xfrm>
-            <a:off x="2638424" y="863255"/>
+            <a:off x="1697831" y="863255"/>
             <a:ext cx="1881186" cy="1881186"/>
           </a:xfrm>
           <a:prstGeom prst="rect">
@@ -4437,7 +4767,7 @@
         </p:blipFill>
         <p:spPr>
           <a:xfrm>
-            <a:off x="5894201" y="863255"/>
+            <a:off x="6830644" y="863255"/>
             <a:ext cx="1881186" cy="1881186"/>
           </a:xfrm>
           <a:prstGeom prst="rect">

</xml_diff>